<commit_message>
Updated report and powerpoint
</commit_message>
<xml_diff>
--- a/ csc533/Project 2 - Bayesian Networks/Project 2.pptx
+++ b/ csc533/Project 2 - Bayesian Networks/Project 2.pptx
@@ -9,6 +9,8 @@
     <p:sldId id="257" r:id="rId3"/>
     <p:sldId id="258" r:id="rId4"/>
     <p:sldId id="259" r:id="rId5"/>
+    <p:sldId id="260" r:id="rId6"/>
+    <p:sldId id="261" r:id="rId7"/>
   </p:sldIdLst>
   <p:sldSz cx="9144000" cy="6858000" type="screen4x3"/>
   <p:notesSz cx="6858000" cy="9144000"/>
@@ -7479,6 +7481,2161 @@
                       <a:srgbClr val="95B3D7"/>
                     </a:solidFill>
                   </a:tcPr>
+                </a:tc>
+              </a:tr>
+            </a:tbl>
+          </a:graphicData>
+        </a:graphic>
+      </p:graphicFrame>
+    </p:spTree>
+  </p:cSld>
+  <p:clrMapOvr>
+    <a:masterClrMapping/>
+  </p:clrMapOvr>
+  <p:timing>
+    <p:tnLst>
+      <p:par>
+        <p:cTn id="1" dur="indefinite" restart="never" nodeType="tmRoot"/>
+      </p:par>
+    </p:tnLst>
+  </p:timing>
+</p:sld>
+</file>
+
+<file path=ppt/slides/slide5.xml><?xml version="1.0" encoding="utf-8"?>
+<p:sld xmlns:a="http://schemas.openxmlformats.org/drawingml/2006/main" xmlns:r="http://schemas.openxmlformats.org/officeDocument/2006/relationships" xmlns:p="http://schemas.openxmlformats.org/presentationml/2006/main">
+  <p:cSld>
+    <p:spTree>
+      <p:nvGrpSpPr>
+        <p:cNvPr id="1" name=""/>
+        <p:cNvGrpSpPr/>
+        <p:nvPr/>
+      </p:nvGrpSpPr>
+      <p:grpSpPr>
+        <a:xfrm>
+          <a:off x="0" y="0"/>
+          <a:ext cx="0" cy="0"/>
+          <a:chOff x="0" y="0"/>
+          <a:chExt cx="0" cy="0"/>
+        </a:xfrm>
+      </p:grpSpPr>
+      <p:sp>
+        <p:nvSpPr>
+          <p:cNvPr id="4" name="Rounded Rectangle 3"/>
+          <p:cNvSpPr/>
+          <p:nvPr/>
+        </p:nvSpPr>
+        <p:spPr>
+          <a:xfrm>
+            <a:off x="1524000" y="1676400"/>
+            <a:ext cx="1143000" cy="785813"/>
+          </a:xfrm>
+          <a:prstGeom prst="roundRect">
+            <a:avLst/>
+          </a:prstGeom>
+        </p:spPr>
+        <p:style>
+          <a:lnRef idx="2">
+            <a:schemeClr val="accent1">
+              <a:shade val="50000"/>
+            </a:schemeClr>
+          </a:lnRef>
+          <a:fillRef idx="1">
+            <a:schemeClr val="accent1"/>
+          </a:fillRef>
+          <a:effectRef idx="0">
+            <a:schemeClr val="accent1"/>
+          </a:effectRef>
+          <a:fontRef idx="minor">
+            <a:schemeClr val="lt1"/>
+          </a:fontRef>
+        </p:style>
+        <p:txBody>
+          <a:bodyPr rtlCol="0" anchor="ctr"/>
+          <a:lstStyle/>
+          <a:p>
+            <a:pPr algn="ctr"/>
+            <a:r>
+              <a:rPr lang="en-US" dirty="0" smtClean="0"/>
+              <a:t>Asian </a:t>
+            </a:r>
+            <a:r>
+              <a:rPr lang="en-US" dirty="0" smtClean="0"/>
+              <a:t>Travel (A)</a:t>
+            </a:r>
+            <a:endParaRPr lang="en-US" dirty="0"/>
+          </a:p>
+        </p:txBody>
+      </p:sp>
+      <p:sp>
+        <p:nvSpPr>
+          <p:cNvPr id="5" name="Rounded Rectangle 4"/>
+          <p:cNvSpPr/>
+          <p:nvPr/>
+        </p:nvSpPr>
+        <p:spPr>
+          <a:xfrm>
+            <a:off x="6096000" y="1676400"/>
+            <a:ext cx="1371600" cy="785813"/>
+          </a:xfrm>
+          <a:prstGeom prst="roundRect">
+            <a:avLst/>
+          </a:prstGeom>
+        </p:spPr>
+        <p:style>
+          <a:lnRef idx="2">
+            <a:schemeClr val="accent1">
+              <a:shade val="50000"/>
+            </a:schemeClr>
+          </a:lnRef>
+          <a:fillRef idx="1">
+            <a:schemeClr val="accent1"/>
+          </a:fillRef>
+          <a:effectRef idx="0">
+            <a:schemeClr val="accent1"/>
+          </a:effectRef>
+          <a:fontRef idx="minor">
+            <a:schemeClr val="lt1"/>
+          </a:fontRef>
+        </p:style>
+        <p:txBody>
+          <a:bodyPr rtlCol="0" anchor="ctr"/>
+          <a:lstStyle/>
+          <a:p>
+            <a:pPr algn="ctr"/>
+            <a:r>
+              <a:rPr lang="en-US" dirty="0" smtClean="0"/>
+              <a:t>Smoking (S)</a:t>
+            </a:r>
+            <a:endParaRPr lang="en-US" dirty="0"/>
+          </a:p>
+        </p:txBody>
+      </p:sp>
+      <p:sp>
+        <p:nvSpPr>
+          <p:cNvPr id="7" name="Rounded Rectangle 6"/>
+          <p:cNvSpPr/>
+          <p:nvPr/>
+        </p:nvSpPr>
+        <p:spPr>
+          <a:xfrm>
+            <a:off x="2438400" y="5219700"/>
+            <a:ext cx="1600200" cy="785813"/>
+          </a:xfrm>
+          <a:prstGeom prst="roundRect">
+            <a:avLst/>
+          </a:prstGeom>
+        </p:spPr>
+        <p:style>
+          <a:lnRef idx="2">
+            <a:schemeClr val="accent1">
+              <a:shade val="50000"/>
+            </a:schemeClr>
+          </a:lnRef>
+          <a:fillRef idx="1">
+            <a:schemeClr val="accent1"/>
+          </a:fillRef>
+          <a:effectRef idx="0">
+            <a:schemeClr val="accent1"/>
+          </a:effectRef>
+          <a:fontRef idx="minor">
+            <a:schemeClr val="lt1"/>
+          </a:fontRef>
+        </p:style>
+        <p:txBody>
+          <a:bodyPr rtlCol="0" anchor="ctr"/>
+          <a:lstStyle/>
+          <a:p>
+            <a:pPr algn="ctr"/>
+            <a:r>
+              <a:rPr lang="en-US" dirty="0" smtClean="0"/>
+              <a:t>Tuberculosis (T) </a:t>
+            </a:r>
+            <a:endParaRPr lang="en-US" dirty="0"/>
+          </a:p>
+        </p:txBody>
+      </p:sp>
+      <p:sp>
+        <p:nvSpPr>
+          <p:cNvPr id="8" name="Rounded Rectangle 7"/>
+          <p:cNvSpPr/>
+          <p:nvPr/>
+        </p:nvSpPr>
+        <p:spPr>
+          <a:xfrm>
+            <a:off x="4724400" y="4038600"/>
+            <a:ext cx="1143000" cy="785813"/>
+          </a:xfrm>
+          <a:prstGeom prst="roundRect">
+            <a:avLst/>
+          </a:prstGeom>
+        </p:spPr>
+        <p:style>
+          <a:lnRef idx="2">
+            <a:schemeClr val="accent1">
+              <a:shade val="50000"/>
+            </a:schemeClr>
+          </a:lnRef>
+          <a:fillRef idx="1">
+            <a:schemeClr val="accent1"/>
+          </a:fillRef>
+          <a:effectRef idx="0">
+            <a:schemeClr val="accent1"/>
+          </a:effectRef>
+          <a:fontRef idx="minor">
+            <a:schemeClr val="lt1"/>
+          </a:fontRef>
+        </p:style>
+        <p:txBody>
+          <a:bodyPr rtlCol="0" anchor="ctr"/>
+          <a:lstStyle/>
+          <a:p>
+            <a:pPr algn="ctr"/>
+            <a:r>
+              <a:rPr lang="en-US" dirty="0" smtClean="0"/>
+              <a:t>Lung </a:t>
+            </a:r>
+            <a:r>
+              <a:rPr lang="en-US" dirty="0" smtClean="0"/>
+              <a:t>Cancer (L)</a:t>
+            </a:r>
+            <a:endParaRPr lang="en-US" dirty="0"/>
+          </a:p>
+        </p:txBody>
+      </p:sp>
+      <p:sp>
+        <p:nvSpPr>
+          <p:cNvPr id="10" name="Rounded Rectangle 9"/>
+          <p:cNvSpPr/>
+          <p:nvPr/>
+        </p:nvSpPr>
+        <p:spPr>
+          <a:xfrm>
+            <a:off x="7315200" y="4267200"/>
+            <a:ext cx="1285875" cy="785813"/>
+          </a:xfrm>
+          <a:prstGeom prst="roundRect">
+            <a:avLst/>
+          </a:prstGeom>
+        </p:spPr>
+        <p:style>
+          <a:lnRef idx="2">
+            <a:schemeClr val="accent1">
+              <a:shade val="50000"/>
+            </a:schemeClr>
+          </a:lnRef>
+          <a:fillRef idx="1">
+            <a:schemeClr val="accent1"/>
+          </a:fillRef>
+          <a:effectRef idx="0">
+            <a:schemeClr val="accent1"/>
+          </a:effectRef>
+          <a:fontRef idx="minor">
+            <a:schemeClr val="lt1"/>
+          </a:fontRef>
+        </p:style>
+        <p:txBody>
+          <a:bodyPr rtlCol="0" anchor="ctr"/>
+          <a:lstStyle/>
+          <a:p>
+            <a:pPr algn="ctr"/>
+            <a:r>
+              <a:rPr lang="en-US" dirty="0" smtClean="0"/>
+              <a:t>Bronchitis (B)</a:t>
+            </a:r>
+            <a:endParaRPr lang="en-US" dirty="0"/>
+          </a:p>
+        </p:txBody>
+      </p:sp>
+      <p:sp>
+        <p:nvSpPr>
+          <p:cNvPr id="11" name="Right Arrow 10"/>
+          <p:cNvSpPr/>
+          <p:nvPr/>
+        </p:nvSpPr>
+        <p:spPr>
+          <a:xfrm rot="7019141">
+            <a:off x="5292335" y="3145063"/>
+            <a:ext cx="1345293" cy="304800"/>
+          </a:xfrm>
+          <a:prstGeom prst="rightArrow">
+            <a:avLst/>
+          </a:prstGeom>
+        </p:spPr>
+        <p:style>
+          <a:lnRef idx="2">
+            <a:schemeClr val="accent6">
+              <a:shade val="50000"/>
+            </a:schemeClr>
+          </a:lnRef>
+          <a:fillRef idx="1">
+            <a:schemeClr val="accent6"/>
+          </a:fillRef>
+          <a:effectRef idx="0">
+            <a:schemeClr val="accent6"/>
+          </a:effectRef>
+          <a:fontRef idx="minor">
+            <a:schemeClr val="lt1"/>
+          </a:fontRef>
+        </p:style>
+        <p:txBody>
+          <a:bodyPr rtlCol="0" anchor="ctr"/>
+          <a:lstStyle/>
+          <a:p>
+            <a:pPr algn="ctr"/>
+            <a:endParaRPr lang="en-US"/>
+          </a:p>
+        </p:txBody>
+      </p:sp>
+      <p:sp>
+        <p:nvSpPr>
+          <p:cNvPr id="13" name="Right Arrow 12"/>
+          <p:cNvSpPr/>
+          <p:nvPr/>
+        </p:nvSpPr>
+        <p:spPr>
+          <a:xfrm rot="4394964">
+            <a:off x="6574100" y="3276599"/>
+            <a:ext cx="1207743" cy="304800"/>
+          </a:xfrm>
+          <a:prstGeom prst="rightArrow">
+            <a:avLst/>
+          </a:prstGeom>
+        </p:spPr>
+        <p:style>
+          <a:lnRef idx="2">
+            <a:schemeClr val="accent6">
+              <a:shade val="50000"/>
+            </a:schemeClr>
+          </a:lnRef>
+          <a:fillRef idx="1">
+            <a:schemeClr val="accent6"/>
+          </a:fillRef>
+          <a:effectRef idx="0">
+            <a:schemeClr val="accent6"/>
+          </a:effectRef>
+          <a:fontRef idx="minor">
+            <a:schemeClr val="lt1"/>
+          </a:fontRef>
+        </p:style>
+        <p:txBody>
+          <a:bodyPr rtlCol="0" anchor="ctr"/>
+          <a:lstStyle/>
+          <a:p>
+            <a:pPr algn="ctr"/>
+            <a:endParaRPr lang="en-US"/>
+          </a:p>
+        </p:txBody>
+      </p:sp>
+      <p:sp>
+        <p:nvSpPr>
+          <p:cNvPr id="15" name="Right Arrow 14"/>
+          <p:cNvSpPr/>
+          <p:nvPr/>
+        </p:nvSpPr>
+        <p:spPr>
+          <a:xfrm rot="3922567">
+            <a:off x="1664764" y="3529066"/>
+            <a:ext cx="2343662" cy="304800"/>
+          </a:xfrm>
+          <a:prstGeom prst="rightArrow">
+            <a:avLst/>
+          </a:prstGeom>
+        </p:spPr>
+        <p:style>
+          <a:lnRef idx="2">
+            <a:schemeClr val="accent5">
+              <a:shade val="50000"/>
+            </a:schemeClr>
+          </a:lnRef>
+          <a:fillRef idx="1">
+            <a:schemeClr val="accent5"/>
+          </a:fillRef>
+          <a:effectRef idx="0">
+            <a:schemeClr val="accent5"/>
+          </a:effectRef>
+          <a:fontRef idx="minor">
+            <a:schemeClr val="lt1"/>
+          </a:fontRef>
+        </p:style>
+        <p:txBody>
+          <a:bodyPr rtlCol="0" anchor="ctr"/>
+          <a:lstStyle/>
+          <a:p>
+            <a:pPr algn="ctr"/>
+            <a:endParaRPr lang="en-US"/>
+          </a:p>
+        </p:txBody>
+      </p:sp>
+      <p:graphicFrame>
+        <p:nvGraphicFramePr>
+          <p:cNvPr id="21" name="Table 20"/>
+          <p:cNvGraphicFramePr>
+            <a:graphicFrameLocks noGrp="1"/>
+          </p:cNvGraphicFramePr>
+          <p:nvPr/>
+        </p:nvGraphicFramePr>
+        <p:xfrm>
+          <a:off x="304800" y="1295400"/>
+          <a:ext cx="990600" cy="838200"/>
+        </p:xfrm>
+        <a:graphic>
+          <a:graphicData uri="http://schemas.openxmlformats.org/drawingml/2006/table">
+            <a:tbl>
+              <a:tblPr firstRow="1" bandRow="1">
+                <a:tableStyleId>{F5AB1C69-6EDB-4FF4-983F-18BD219EF322}</a:tableStyleId>
+              </a:tblPr>
+              <a:tblGrid>
+                <a:gridCol w="990600"/>
+              </a:tblGrid>
+              <a:tr h="419100">
+                <a:tc>
+                  <a:txBody>
+                    <a:bodyPr/>
+                    <a:lstStyle/>
+                    <a:p>
+                      <a:pPr algn="ctr"/>
+                      <a:r>
+                        <a:rPr lang="en-US" sz="1600" dirty="0" smtClean="0"/>
+                        <a:t>P(A</a:t>
+                      </a:r>
+                      <a:r>
+                        <a:rPr lang="en-US" dirty="0" smtClean="0"/>
+                        <a:t>)</a:t>
+                      </a:r>
+                      <a:endParaRPr lang="en-US" dirty="0"/>
+                    </a:p>
+                  </a:txBody>
+                  <a:tcPr/>
+                </a:tc>
+              </a:tr>
+              <a:tr h="419100">
+                <a:tc>
+                  <a:txBody>
+                    <a:bodyPr/>
+                    <a:lstStyle/>
+                    <a:p>
+                      <a:endParaRPr lang="en-US" dirty="0"/>
+                    </a:p>
+                  </a:txBody>
+                  <a:tcPr/>
+                </a:tc>
+              </a:tr>
+            </a:tbl>
+          </a:graphicData>
+        </a:graphic>
+      </p:graphicFrame>
+      <p:graphicFrame>
+        <p:nvGraphicFramePr>
+          <p:cNvPr id="22" name="Table 21"/>
+          <p:cNvGraphicFramePr>
+            <a:graphicFrameLocks noGrp="1"/>
+          </p:cNvGraphicFramePr>
+          <p:nvPr/>
+        </p:nvGraphicFramePr>
+        <p:xfrm>
+          <a:off x="7848600" y="1524000"/>
+          <a:ext cx="990600" cy="731520"/>
+        </p:xfrm>
+        <a:graphic>
+          <a:graphicData uri="http://schemas.openxmlformats.org/drawingml/2006/table">
+            <a:tbl>
+              <a:tblPr firstRow="1" bandRow="1">
+                <a:tableStyleId>{F5AB1C69-6EDB-4FF4-983F-18BD219EF322}</a:tableStyleId>
+              </a:tblPr>
+              <a:tblGrid>
+                <a:gridCol w="990600"/>
+              </a:tblGrid>
+              <a:tr h="342900">
+                <a:tc>
+                  <a:txBody>
+                    <a:bodyPr/>
+                    <a:lstStyle/>
+                    <a:p>
+                      <a:pPr algn="ctr"/>
+                      <a:r>
+                        <a:rPr lang="en-US" sz="1400" dirty="0" smtClean="0"/>
+                        <a:t>P(S</a:t>
+                      </a:r>
+                      <a:r>
+                        <a:rPr lang="en-US" dirty="0" smtClean="0"/>
+                        <a:t>)</a:t>
+                      </a:r>
+                      <a:endParaRPr lang="en-US" dirty="0"/>
+                    </a:p>
+                  </a:txBody>
+                  <a:tcPr/>
+                </a:tc>
+              </a:tr>
+              <a:tr h="342900">
+                <a:tc>
+                  <a:txBody>
+                    <a:bodyPr/>
+                    <a:lstStyle/>
+                    <a:p>
+                      <a:endParaRPr lang="en-US" dirty="0"/>
+                    </a:p>
+                  </a:txBody>
+                  <a:tcPr/>
+                </a:tc>
+              </a:tr>
+            </a:tbl>
+          </a:graphicData>
+        </a:graphic>
+      </p:graphicFrame>
+      <p:graphicFrame>
+        <p:nvGraphicFramePr>
+          <p:cNvPr id="23" name="Table 22"/>
+          <p:cNvGraphicFramePr>
+            <a:graphicFrameLocks noGrp="1"/>
+          </p:cNvGraphicFramePr>
+          <p:nvPr/>
+        </p:nvGraphicFramePr>
+        <p:xfrm>
+          <a:off x="304800" y="4419600"/>
+          <a:ext cx="1393889" cy="914400"/>
+        </p:xfrm>
+        <a:graphic>
+          <a:graphicData uri="http://schemas.openxmlformats.org/drawingml/2006/table">
+            <a:tbl>
+              <a:tblPr firstRow="1" bandRow="1">
+                <a:tableStyleId>{F5AB1C69-6EDB-4FF4-983F-18BD219EF322}</a:tableStyleId>
+              </a:tblPr>
+              <a:tblGrid>
+                <a:gridCol w="403289"/>
+                <a:gridCol w="990600"/>
+              </a:tblGrid>
+              <a:tr h="0">
+                <a:tc>
+                  <a:txBody>
+                    <a:bodyPr/>
+                    <a:lstStyle/>
+                    <a:p>
+                      <a:pPr algn="ctr"/>
+                      <a:r>
+                        <a:rPr lang="en-US" sz="1400" baseline="0" dirty="0" smtClean="0"/>
+                        <a:t> A</a:t>
+                      </a:r>
+                      <a:endParaRPr lang="en-US" sz="1400" dirty="0"/>
+                    </a:p>
+                  </a:txBody>
+                  <a:tcPr/>
+                </a:tc>
+                <a:tc>
+                  <a:txBody>
+                    <a:bodyPr/>
+                    <a:lstStyle/>
+                    <a:p>
+                      <a:pPr algn="ctr"/>
+                      <a:r>
+                        <a:rPr lang="en-US" sz="1400" dirty="0" smtClean="0"/>
+                        <a:t>P(T</a:t>
+                      </a:r>
+                      <a:r>
+                        <a:rPr lang="en-US" sz="1400" baseline="0" dirty="0" smtClean="0"/>
+                        <a:t> | A)</a:t>
+                      </a:r>
+                      <a:endParaRPr lang="en-US" sz="1400" dirty="0"/>
+                    </a:p>
+                  </a:txBody>
+                  <a:tcPr/>
+                </a:tc>
+              </a:tr>
+              <a:tr h="0">
+                <a:tc>
+                  <a:txBody>
+                    <a:bodyPr/>
+                    <a:lstStyle/>
+                    <a:p>
+                      <a:pPr algn="ctr"/>
+                      <a:r>
+                        <a:rPr lang="en-US" sz="1400" dirty="0" smtClean="0"/>
+                        <a:t>T</a:t>
+                      </a:r>
+                      <a:endParaRPr lang="en-US" sz="1400" dirty="0"/>
+                    </a:p>
+                  </a:txBody>
+                  <a:tcPr/>
+                </a:tc>
+                <a:tc>
+                  <a:txBody>
+                    <a:bodyPr/>
+                    <a:lstStyle/>
+                    <a:p>
+                      <a:pPr algn="ctr"/>
+                      <a:endParaRPr lang="en-US" sz="1400" dirty="0"/>
+                    </a:p>
+                  </a:txBody>
+                  <a:tcPr/>
+                </a:tc>
+              </a:tr>
+              <a:tr h="0">
+                <a:tc>
+                  <a:txBody>
+                    <a:bodyPr/>
+                    <a:lstStyle/>
+                    <a:p>
+                      <a:pPr algn="ctr"/>
+                      <a:r>
+                        <a:rPr lang="en-US" sz="1400" dirty="0" smtClean="0"/>
+                        <a:t>F</a:t>
+                      </a:r>
+                      <a:endParaRPr lang="en-US" sz="1400" dirty="0"/>
+                    </a:p>
+                  </a:txBody>
+                  <a:tcPr/>
+                </a:tc>
+                <a:tc>
+                  <a:txBody>
+                    <a:bodyPr/>
+                    <a:lstStyle/>
+                    <a:p>
+                      <a:pPr algn="ctr"/>
+                      <a:endParaRPr lang="en-US" sz="1400" dirty="0"/>
+                    </a:p>
+                  </a:txBody>
+                  <a:tcPr/>
+                </a:tc>
+              </a:tr>
+            </a:tbl>
+          </a:graphicData>
+        </a:graphic>
+      </p:graphicFrame>
+      <p:graphicFrame>
+        <p:nvGraphicFramePr>
+          <p:cNvPr id="24" name="Table 23"/>
+          <p:cNvGraphicFramePr>
+            <a:graphicFrameLocks noGrp="1"/>
+          </p:cNvGraphicFramePr>
+          <p:nvPr/>
+        </p:nvGraphicFramePr>
+        <p:xfrm>
+          <a:off x="3429000" y="2914649"/>
+          <a:ext cx="1371918" cy="1028701"/>
+        </p:xfrm>
+        <a:graphic>
+          <a:graphicData uri="http://schemas.openxmlformats.org/drawingml/2006/table">
+            <a:tbl>
+              <a:tblPr firstRow="1" bandRow="1">
+                <a:tableStyleId>{F5AB1C69-6EDB-4FF4-983F-18BD219EF322}</a:tableStyleId>
+              </a:tblPr>
+              <a:tblGrid>
+                <a:gridCol w="400368"/>
+                <a:gridCol w="971550"/>
+              </a:tblGrid>
+              <a:tr h="327314">
+                <a:tc>
+                  <a:txBody>
+                    <a:bodyPr/>
+                    <a:lstStyle/>
+                    <a:p>
+                      <a:pPr algn="ctr"/>
+                      <a:r>
+                        <a:rPr lang="en-US" sz="1400" baseline="0" dirty="0" smtClean="0"/>
+                        <a:t> S</a:t>
+                      </a:r>
+                      <a:endParaRPr lang="en-US" sz="1400" dirty="0"/>
+                    </a:p>
+                  </a:txBody>
+                  <a:tcPr/>
+                </a:tc>
+                <a:tc>
+                  <a:txBody>
+                    <a:bodyPr/>
+                    <a:lstStyle/>
+                    <a:p>
+                      <a:pPr algn="ctr"/>
+                      <a:r>
+                        <a:rPr lang="en-US" sz="1400" dirty="0" smtClean="0"/>
+                        <a:t>P(L</a:t>
+                      </a:r>
+                      <a:r>
+                        <a:rPr lang="en-US" sz="1400" baseline="0" dirty="0" smtClean="0"/>
+                        <a:t> | S)</a:t>
+                      </a:r>
+                      <a:endParaRPr lang="en-US" sz="1400" dirty="0"/>
+                    </a:p>
+                  </a:txBody>
+                  <a:tcPr/>
+                </a:tc>
+              </a:tr>
+              <a:tr h="374073">
+                <a:tc>
+                  <a:txBody>
+                    <a:bodyPr/>
+                    <a:lstStyle/>
+                    <a:p>
+                      <a:pPr algn="ctr"/>
+                      <a:r>
+                        <a:rPr lang="en-US" sz="1400" dirty="0" smtClean="0"/>
+                        <a:t>T</a:t>
+                      </a:r>
+                      <a:endParaRPr lang="en-US" sz="1400" dirty="0"/>
+                    </a:p>
+                  </a:txBody>
+                  <a:tcPr/>
+                </a:tc>
+                <a:tc>
+                  <a:txBody>
+                    <a:bodyPr/>
+                    <a:lstStyle/>
+                    <a:p>
+                      <a:pPr algn="ctr"/>
+                      <a:endParaRPr lang="en-US" sz="1400" dirty="0"/>
+                    </a:p>
+                  </a:txBody>
+                  <a:tcPr/>
+                </a:tc>
+              </a:tr>
+              <a:tr h="327314">
+                <a:tc>
+                  <a:txBody>
+                    <a:bodyPr/>
+                    <a:lstStyle/>
+                    <a:p>
+                      <a:pPr algn="ctr"/>
+                      <a:r>
+                        <a:rPr lang="en-US" sz="1400" dirty="0" smtClean="0"/>
+                        <a:t>F</a:t>
+                      </a:r>
+                      <a:endParaRPr lang="en-US" sz="1400" dirty="0"/>
+                    </a:p>
+                  </a:txBody>
+                  <a:tcPr/>
+                </a:tc>
+                <a:tc>
+                  <a:txBody>
+                    <a:bodyPr/>
+                    <a:lstStyle/>
+                    <a:p>
+                      <a:pPr algn="ctr"/>
+                      <a:endParaRPr lang="en-US" sz="1400" dirty="0"/>
+                    </a:p>
+                  </a:txBody>
+                  <a:tcPr/>
+                </a:tc>
+              </a:tr>
+            </a:tbl>
+          </a:graphicData>
+        </a:graphic>
+      </p:graphicFrame>
+      <p:graphicFrame>
+        <p:nvGraphicFramePr>
+          <p:cNvPr id="25" name="Table 24"/>
+          <p:cNvGraphicFramePr>
+            <a:graphicFrameLocks noGrp="1"/>
+          </p:cNvGraphicFramePr>
+          <p:nvPr/>
+        </p:nvGraphicFramePr>
+        <p:xfrm>
+          <a:off x="6705600" y="5410200"/>
+          <a:ext cx="1352868" cy="992257"/>
+        </p:xfrm>
+        <a:graphic>
+          <a:graphicData uri="http://schemas.openxmlformats.org/drawingml/2006/table">
+            <a:tbl>
+              <a:tblPr firstRow="1" bandRow="1">
+                <a:tableStyleId>{F5AB1C69-6EDB-4FF4-983F-18BD219EF322}</a:tableStyleId>
+              </a:tblPr>
+              <a:tblGrid>
+                <a:gridCol w="400368"/>
+                <a:gridCol w="952500"/>
+              </a:tblGrid>
+              <a:tr h="382657">
+                <a:tc>
+                  <a:txBody>
+                    <a:bodyPr/>
+                    <a:lstStyle/>
+                    <a:p>
+                      <a:pPr algn="ctr"/>
+                      <a:r>
+                        <a:rPr lang="en-US" sz="1400" baseline="0" dirty="0" smtClean="0"/>
+                        <a:t> S</a:t>
+                      </a:r>
+                      <a:endParaRPr lang="en-US" sz="1400" dirty="0"/>
+                    </a:p>
+                  </a:txBody>
+                  <a:tcPr/>
+                </a:tc>
+                <a:tc>
+                  <a:txBody>
+                    <a:bodyPr/>
+                    <a:lstStyle/>
+                    <a:p>
+                      <a:pPr algn="ctr"/>
+                      <a:r>
+                        <a:rPr lang="en-US" sz="1400" dirty="0" smtClean="0"/>
+                        <a:t>P(B</a:t>
+                      </a:r>
+                      <a:r>
+                        <a:rPr lang="en-US" sz="1400" baseline="0" dirty="0" smtClean="0"/>
+                        <a:t> | S)</a:t>
+                      </a:r>
+                      <a:endParaRPr lang="en-US" sz="1400" dirty="0"/>
+                    </a:p>
+                  </a:txBody>
+                  <a:tcPr/>
+                </a:tc>
+              </a:tr>
+              <a:tr h="227772">
+                <a:tc>
+                  <a:txBody>
+                    <a:bodyPr/>
+                    <a:lstStyle/>
+                    <a:p>
+                      <a:pPr algn="ctr"/>
+                      <a:r>
+                        <a:rPr lang="en-US" sz="1400" dirty="0" smtClean="0"/>
+                        <a:t>T</a:t>
+                      </a:r>
+                      <a:endParaRPr lang="en-US" sz="1400" dirty="0"/>
+                    </a:p>
+                  </a:txBody>
+                  <a:tcPr/>
+                </a:tc>
+                <a:tc>
+                  <a:txBody>
+                    <a:bodyPr/>
+                    <a:lstStyle/>
+                    <a:p>
+                      <a:pPr algn="ctr"/>
+                      <a:endParaRPr lang="en-US" sz="1400" dirty="0"/>
+                    </a:p>
+                  </a:txBody>
+                  <a:tcPr/>
+                </a:tc>
+              </a:tr>
+              <a:tr h="227772">
+                <a:tc>
+                  <a:txBody>
+                    <a:bodyPr/>
+                    <a:lstStyle/>
+                    <a:p>
+                      <a:pPr algn="ctr"/>
+                      <a:r>
+                        <a:rPr lang="en-US" sz="1400" dirty="0" smtClean="0"/>
+                        <a:t>F</a:t>
+                      </a:r>
+                      <a:endParaRPr lang="en-US" sz="1400" dirty="0"/>
+                    </a:p>
+                  </a:txBody>
+                  <a:tcPr/>
+                </a:tc>
+                <a:tc>
+                  <a:txBody>
+                    <a:bodyPr/>
+                    <a:lstStyle/>
+                    <a:p>
+                      <a:pPr algn="ctr"/>
+                      <a:endParaRPr lang="en-US" sz="1400" dirty="0"/>
+                    </a:p>
+                  </a:txBody>
+                  <a:tcPr/>
+                </a:tc>
+              </a:tr>
+            </a:tbl>
+          </a:graphicData>
+        </a:graphic>
+      </p:graphicFrame>
+      <p:sp>
+        <p:nvSpPr>
+          <p:cNvPr id="27" name="Title 26"/>
+          <p:cNvSpPr>
+            <a:spLocks noGrp="1"/>
+          </p:cNvSpPr>
+          <p:nvPr>
+            <p:ph type="title"/>
+          </p:nvPr>
+        </p:nvSpPr>
+        <p:spPr/>
+        <p:txBody>
+          <a:bodyPr/>
+          <a:lstStyle/>
+          <a:p>
+            <a:pPr algn="ctr"/>
+            <a:r>
+              <a:rPr lang="en-US" dirty="0" smtClean="0"/>
+              <a:t>Bayesian Network (TOP)</a:t>
+            </a:r>
+            <a:endParaRPr lang="en-US" dirty="0"/>
+          </a:p>
+        </p:txBody>
+      </p:sp>
+    </p:spTree>
+  </p:cSld>
+  <p:clrMapOvr>
+    <a:masterClrMapping/>
+  </p:clrMapOvr>
+  <p:timing>
+    <p:tnLst>
+      <p:par>
+        <p:cTn id="1" dur="indefinite" restart="never" nodeType="tmRoot"/>
+      </p:par>
+    </p:tnLst>
+  </p:timing>
+</p:sld>
+</file>
+
+<file path=ppt/slides/slide6.xml><?xml version="1.0" encoding="utf-8"?>
+<p:sld xmlns:a="http://schemas.openxmlformats.org/drawingml/2006/main" xmlns:r="http://schemas.openxmlformats.org/officeDocument/2006/relationships" xmlns:p="http://schemas.openxmlformats.org/presentationml/2006/main">
+  <p:cSld>
+    <p:spTree>
+      <p:nvGrpSpPr>
+        <p:cNvPr id="1" name=""/>
+        <p:cNvGrpSpPr/>
+        <p:nvPr/>
+      </p:nvGrpSpPr>
+      <p:grpSpPr>
+        <a:xfrm>
+          <a:off x="0" y="0"/>
+          <a:ext cx="0" cy="0"/>
+          <a:chOff x="0" y="0"/>
+          <a:chExt cx="0" cy="0"/>
+        </a:xfrm>
+      </p:grpSpPr>
+      <p:graphicFrame>
+        <p:nvGraphicFramePr>
+          <p:cNvPr id="4" name="Table 3"/>
+          <p:cNvGraphicFramePr>
+            <a:graphicFrameLocks noGrp="1"/>
+          </p:cNvGraphicFramePr>
+          <p:nvPr/>
+        </p:nvGraphicFramePr>
+        <p:xfrm>
+          <a:off x="228600" y="4038600"/>
+          <a:ext cx="1721486" cy="2133602"/>
+        </p:xfrm>
+        <a:graphic>
+          <a:graphicData uri="http://schemas.openxmlformats.org/drawingml/2006/table">
+            <a:tbl>
+              <a:tblPr firstRow="1" bandRow="1">
+                <a:tableStyleId>{F5AB1C69-6EDB-4FF4-983F-18BD219EF322}</a:tableStyleId>
+              </a:tblPr>
+              <a:tblGrid>
+                <a:gridCol w="340043"/>
+                <a:gridCol w="340043"/>
+                <a:gridCol w="1041400"/>
+              </a:tblGrid>
+              <a:tr h="363682">
+                <a:tc>
+                  <a:txBody>
+                    <a:bodyPr/>
+                    <a:lstStyle/>
+                    <a:p>
+                      <a:pPr algn="ctr"/>
+                      <a:r>
+                        <a:rPr lang="en-US" sz="1400" dirty="0" smtClean="0"/>
+                        <a:t>T</a:t>
+                      </a:r>
+                      <a:endParaRPr lang="en-US" sz="1400" dirty="0"/>
+                    </a:p>
+                  </a:txBody>
+                  <a:tcPr/>
+                </a:tc>
+                <a:tc>
+                  <a:txBody>
+                    <a:bodyPr/>
+                    <a:lstStyle/>
+                    <a:p>
+                      <a:pPr algn="ctr"/>
+                      <a:r>
+                        <a:rPr lang="en-US" sz="1400" dirty="0" smtClean="0"/>
+                        <a:t>L</a:t>
+                      </a:r>
+                      <a:endParaRPr lang="en-US" sz="1400" dirty="0"/>
+                    </a:p>
+                  </a:txBody>
+                  <a:tcPr/>
+                </a:tc>
+                <a:tc>
+                  <a:txBody>
+                    <a:bodyPr/>
+                    <a:lstStyle/>
+                    <a:p>
+                      <a:pPr algn="ctr"/>
+                      <a:r>
+                        <a:rPr lang="en-US" sz="1400" dirty="0" smtClean="0"/>
+                        <a:t>P(X</a:t>
+                      </a:r>
+                      <a:r>
+                        <a:rPr lang="en-US" sz="1400" baseline="0" dirty="0" smtClean="0"/>
+                        <a:t> | T, L) </a:t>
+                      </a:r>
+                      <a:endParaRPr lang="en-US" sz="1400" dirty="0"/>
+                    </a:p>
+                  </a:txBody>
+                  <a:tcPr/>
+                </a:tc>
+              </a:tr>
+              <a:tr h="442480">
+                <a:tc>
+                  <a:txBody>
+                    <a:bodyPr/>
+                    <a:lstStyle/>
+                    <a:p>
+                      <a:pPr algn="ctr"/>
+                      <a:r>
+                        <a:rPr lang="en-US" sz="1400" dirty="0" smtClean="0"/>
+                        <a:t>F</a:t>
+                      </a:r>
+                      <a:endParaRPr lang="en-US" sz="1400" dirty="0"/>
+                    </a:p>
+                  </a:txBody>
+                  <a:tcPr/>
+                </a:tc>
+                <a:tc>
+                  <a:txBody>
+                    <a:bodyPr/>
+                    <a:lstStyle/>
+                    <a:p>
+                      <a:pPr algn="ctr"/>
+                      <a:r>
+                        <a:rPr lang="en-US" sz="1400" dirty="0" smtClean="0"/>
+                        <a:t>F</a:t>
+                      </a:r>
+                      <a:endParaRPr lang="en-US" sz="1400" dirty="0"/>
+                    </a:p>
+                  </a:txBody>
+                  <a:tcPr/>
+                </a:tc>
+                <a:tc>
+                  <a:txBody>
+                    <a:bodyPr/>
+                    <a:lstStyle/>
+                    <a:p>
+                      <a:pPr algn="ctr"/>
+                      <a:endParaRPr lang="en-US" sz="1400" dirty="0"/>
+                    </a:p>
+                  </a:txBody>
+                  <a:tcPr/>
+                </a:tc>
+              </a:tr>
+              <a:tr h="442480">
+                <a:tc>
+                  <a:txBody>
+                    <a:bodyPr/>
+                    <a:lstStyle/>
+                    <a:p>
+                      <a:pPr algn="ctr"/>
+                      <a:r>
+                        <a:rPr lang="en-US" sz="1400" dirty="0" smtClean="0"/>
+                        <a:t>F</a:t>
+                      </a:r>
+                      <a:endParaRPr lang="en-US" sz="1400" dirty="0"/>
+                    </a:p>
+                  </a:txBody>
+                  <a:tcPr/>
+                </a:tc>
+                <a:tc>
+                  <a:txBody>
+                    <a:bodyPr/>
+                    <a:lstStyle/>
+                    <a:p>
+                      <a:pPr algn="ctr"/>
+                      <a:r>
+                        <a:rPr lang="en-US" sz="1400" dirty="0" smtClean="0"/>
+                        <a:t>T</a:t>
+                      </a:r>
+                      <a:endParaRPr lang="en-US" sz="1400" dirty="0"/>
+                    </a:p>
+                  </a:txBody>
+                  <a:tcPr/>
+                </a:tc>
+                <a:tc>
+                  <a:txBody>
+                    <a:bodyPr/>
+                    <a:lstStyle/>
+                    <a:p>
+                      <a:pPr algn="ctr"/>
+                      <a:endParaRPr lang="en-US" sz="1400" dirty="0"/>
+                    </a:p>
+                  </a:txBody>
+                  <a:tcPr/>
+                </a:tc>
+              </a:tr>
+              <a:tr h="442480">
+                <a:tc>
+                  <a:txBody>
+                    <a:bodyPr/>
+                    <a:lstStyle/>
+                    <a:p>
+                      <a:pPr algn="ctr"/>
+                      <a:r>
+                        <a:rPr lang="en-US" sz="1400" dirty="0" smtClean="0"/>
+                        <a:t>T</a:t>
+                      </a:r>
+                      <a:endParaRPr lang="en-US" sz="1400" dirty="0"/>
+                    </a:p>
+                  </a:txBody>
+                  <a:tcPr/>
+                </a:tc>
+                <a:tc>
+                  <a:txBody>
+                    <a:bodyPr/>
+                    <a:lstStyle/>
+                    <a:p>
+                      <a:pPr algn="ctr"/>
+                      <a:r>
+                        <a:rPr lang="en-US" sz="1400" dirty="0" smtClean="0"/>
+                        <a:t>F</a:t>
+                      </a:r>
+                      <a:endParaRPr lang="en-US" sz="1400" dirty="0"/>
+                    </a:p>
+                  </a:txBody>
+                  <a:tcPr/>
+                </a:tc>
+                <a:tc>
+                  <a:txBody>
+                    <a:bodyPr/>
+                    <a:lstStyle/>
+                    <a:p>
+                      <a:pPr algn="ctr"/>
+                      <a:endParaRPr lang="en-US" sz="1400" dirty="0"/>
+                    </a:p>
+                  </a:txBody>
+                  <a:tcPr/>
+                </a:tc>
+              </a:tr>
+              <a:tr h="442480">
+                <a:tc>
+                  <a:txBody>
+                    <a:bodyPr/>
+                    <a:lstStyle/>
+                    <a:p>
+                      <a:pPr algn="ctr"/>
+                      <a:r>
+                        <a:rPr lang="en-US" sz="1400" dirty="0" smtClean="0"/>
+                        <a:t>T</a:t>
+                      </a:r>
+                      <a:endParaRPr lang="en-US" sz="1400" dirty="0"/>
+                    </a:p>
+                  </a:txBody>
+                  <a:tcPr/>
+                </a:tc>
+                <a:tc>
+                  <a:txBody>
+                    <a:bodyPr/>
+                    <a:lstStyle/>
+                    <a:p>
+                      <a:pPr algn="ctr"/>
+                      <a:r>
+                        <a:rPr lang="en-US" sz="1400" dirty="0" smtClean="0"/>
+                        <a:t>T</a:t>
+                      </a:r>
+                      <a:endParaRPr lang="en-US" sz="1400" dirty="0"/>
+                    </a:p>
+                  </a:txBody>
+                  <a:tcPr/>
+                </a:tc>
+                <a:tc>
+                  <a:txBody>
+                    <a:bodyPr/>
+                    <a:lstStyle/>
+                    <a:p>
+                      <a:pPr algn="ctr"/>
+                      <a:endParaRPr lang="en-US" sz="1400" dirty="0"/>
+                    </a:p>
+                  </a:txBody>
+                  <a:tcPr/>
+                </a:tc>
+              </a:tr>
+            </a:tbl>
+          </a:graphicData>
+        </a:graphic>
+      </p:graphicFrame>
+      <p:sp>
+        <p:nvSpPr>
+          <p:cNvPr id="5" name="Rounded Rectangle 4"/>
+          <p:cNvSpPr/>
+          <p:nvPr/>
+        </p:nvSpPr>
+        <p:spPr>
+          <a:xfrm>
+            <a:off x="5029200" y="3124200"/>
+            <a:ext cx="1219200" cy="838200"/>
+          </a:xfrm>
+          <a:prstGeom prst="roundRect">
+            <a:avLst/>
+          </a:prstGeom>
+        </p:spPr>
+        <p:style>
+          <a:lnRef idx="2">
+            <a:schemeClr val="accent1">
+              <a:shade val="50000"/>
+            </a:schemeClr>
+          </a:lnRef>
+          <a:fillRef idx="1">
+            <a:schemeClr val="accent1"/>
+          </a:fillRef>
+          <a:effectRef idx="0">
+            <a:schemeClr val="accent1"/>
+          </a:effectRef>
+          <a:fontRef idx="minor">
+            <a:schemeClr val="lt1"/>
+          </a:fontRef>
+        </p:style>
+        <p:txBody>
+          <a:bodyPr rtlCol="0" anchor="ctr"/>
+          <a:lstStyle/>
+          <a:p>
+            <a:pPr algn="ctr"/>
+            <a:r>
+              <a:rPr lang="en-US" dirty="0" err="1" smtClean="0"/>
+              <a:t>Dyspnea</a:t>
+            </a:r>
+            <a:endParaRPr lang="en-US" dirty="0" smtClean="0"/>
+          </a:p>
+          <a:p>
+            <a:pPr algn="ctr"/>
+            <a:r>
+              <a:rPr lang="en-US" dirty="0" smtClean="0"/>
+              <a:t>(D)</a:t>
+            </a:r>
+            <a:endParaRPr lang="en-US" dirty="0" smtClean="0"/>
+          </a:p>
+        </p:txBody>
+      </p:sp>
+      <p:sp>
+        <p:nvSpPr>
+          <p:cNvPr id="6" name="Rounded Rectangle 5"/>
+          <p:cNvSpPr/>
+          <p:nvPr/>
+        </p:nvSpPr>
+        <p:spPr>
+          <a:xfrm>
+            <a:off x="1676400" y="1371600"/>
+            <a:ext cx="1600200" cy="838200"/>
+          </a:xfrm>
+          <a:prstGeom prst="roundRect">
+            <a:avLst/>
+          </a:prstGeom>
+        </p:spPr>
+        <p:style>
+          <a:lnRef idx="2">
+            <a:schemeClr val="accent1">
+              <a:shade val="50000"/>
+            </a:schemeClr>
+          </a:lnRef>
+          <a:fillRef idx="1">
+            <a:schemeClr val="accent1"/>
+          </a:fillRef>
+          <a:effectRef idx="0">
+            <a:schemeClr val="accent1"/>
+          </a:effectRef>
+          <a:fontRef idx="minor">
+            <a:schemeClr val="lt1"/>
+          </a:fontRef>
+        </p:style>
+        <p:txBody>
+          <a:bodyPr rtlCol="0" anchor="ctr"/>
+          <a:lstStyle/>
+          <a:p>
+            <a:pPr algn="ctr"/>
+            <a:r>
+              <a:rPr lang="en-US" dirty="0" smtClean="0"/>
+              <a:t>Tuberculosis (T)</a:t>
+            </a:r>
+            <a:endParaRPr lang="en-US" dirty="0"/>
+          </a:p>
+        </p:txBody>
+      </p:sp>
+      <p:sp>
+        <p:nvSpPr>
+          <p:cNvPr id="7" name="Rounded Rectangle 6"/>
+          <p:cNvSpPr/>
+          <p:nvPr/>
+        </p:nvSpPr>
+        <p:spPr>
+          <a:xfrm>
+            <a:off x="4114800" y="1676400"/>
+            <a:ext cx="1219200" cy="838200"/>
+          </a:xfrm>
+          <a:prstGeom prst="roundRect">
+            <a:avLst/>
+          </a:prstGeom>
+        </p:spPr>
+        <p:style>
+          <a:lnRef idx="2">
+            <a:schemeClr val="accent1">
+              <a:shade val="50000"/>
+            </a:schemeClr>
+          </a:lnRef>
+          <a:fillRef idx="1">
+            <a:schemeClr val="accent1"/>
+          </a:fillRef>
+          <a:effectRef idx="0">
+            <a:schemeClr val="accent1"/>
+          </a:effectRef>
+          <a:fontRef idx="minor">
+            <a:schemeClr val="lt1"/>
+          </a:fontRef>
+        </p:style>
+        <p:txBody>
+          <a:bodyPr rtlCol="0" anchor="ctr"/>
+          <a:lstStyle/>
+          <a:p>
+            <a:pPr algn="ctr"/>
+            <a:r>
+              <a:rPr lang="en-US" dirty="0" smtClean="0"/>
+              <a:t>Lung </a:t>
+            </a:r>
+            <a:r>
+              <a:rPr lang="en-US" dirty="0" smtClean="0"/>
+              <a:t>Cancer</a:t>
+            </a:r>
+          </a:p>
+          <a:p>
+            <a:pPr algn="ctr"/>
+            <a:r>
+              <a:rPr lang="en-US" dirty="0" smtClean="0"/>
+              <a:t>(L)</a:t>
+            </a:r>
+            <a:endParaRPr lang="en-US" dirty="0"/>
+          </a:p>
+        </p:txBody>
+      </p:sp>
+      <p:sp>
+        <p:nvSpPr>
+          <p:cNvPr id="8" name="Rounded Rectangle 7"/>
+          <p:cNvSpPr/>
+          <p:nvPr/>
+        </p:nvSpPr>
+        <p:spPr>
+          <a:xfrm>
+            <a:off x="1219200" y="3009900"/>
+            <a:ext cx="1752600" cy="838200"/>
+          </a:xfrm>
+          <a:prstGeom prst="roundRect">
+            <a:avLst/>
+          </a:prstGeom>
+        </p:spPr>
+        <p:style>
+          <a:lnRef idx="2">
+            <a:schemeClr val="accent1">
+              <a:shade val="50000"/>
+            </a:schemeClr>
+          </a:lnRef>
+          <a:fillRef idx="1">
+            <a:schemeClr val="accent1"/>
+          </a:fillRef>
+          <a:effectRef idx="0">
+            <a:schemeClr val="accent1"/>
+          </a:effectRef>
+          <a:fontRef idx="minor">
+            <a:schemeClr val="lt1"/>
+          </a:fontRef>
+        </p:style>
+        <p:txBody>
+          <a:bodyPr rtlCol="0" anchor="ctr"/>
+          <a:lstStyle/>
+          <a:p>
+            <a:pPr algn="ctr"/>
+            <a:r>
+              <a:rPr lang="en-US" dirty="0" err="1" smtClean="0"/>
+              <a:t>CXRFindings</a:t>
+            </a:r>
+            <a:endParaRPr lang="en-US" dirty="0" smtClean="0"/>
+          </a:p>
+          <a:p>
+            <a:pPr algn="ctr"/>
+            <a:r>
+              <a:rPr lang="en-US" dirty="0" smtClean="0"/>
+              <a:t>(X)</a:t>
+            </a:r>
+            <a:endParaRPr lang="en-US" dirty="0"/>
+          </a:p>
+        </p:txBody>
+      </p:sp>
+      <p:sp>
+        <p:nvSpPr>
+          <p:cNvPr id="9" name="Rounded Rectangle 8"/>
+          <p:cNvSpPr/>
+          <p:nvPr/>
+        </p:nvSpPr>
+        <p:spPr>
+          <a:xfrm>
+            <a:off x="6019800" y="1676400"/>
+            <a:ext cx="1371600" cy="838200"/>
+          </a:xfrm>
+          <a:prstGeom prst="roundRect">
+            <a:avLst/>
+          </a:prstGeom>
+        </p:spPr>
+        <p:style>
+          <a:lnRef idx="2">
+            <a:schemeClr val="accent1">
+              <a:shade val="50000"/>
+            </a:schemeClr>
+          </a:lnRef>
+          <a:fillRef idx="1">
+            <a:schemeClr val="accent1"/>
+          </a:fillRef>
+          <a:effectRef idx="0">
+            <a:schemeClr val="accent1"/>
+          </a:effectRef>
+          <a:fontRef idx="minor">
+            <a:schemeClr val="lt1"/>
+          </a:fontRef>
+        </p:style>
+        <p:txBody>
+          <a:bodyPr rtlCol="0" anchor="ctr"/>
+          <a:lstStyle/>
+          <a:p>
+            <a:pPr algn="ctr"/>
+            <a:r>
+              <a:rPr lang="en-US" dirty="0" smtClean="0"/>
+              <a:t>Bronchitis</a:t>
+            </a:r>
+          </a:p>
+          <a:p>
+            <a:pPr algn="ctr"/>
+            <a:r>
+              <a:rPr lang="en-US" dirty="0" smtClean="0"/>
+              <a:t>(B)</a:t>
+            </a:r>
+          </a:p>
+        </p:txBody>
+      </p:sp>
+      <p:sp>
+        <p:nvSpPr>
+          <p:cNvPr id="10" name="Right Arrow 9"/>
+          <p:cNvSpPr/>
+          <p:nvPr/>
+        </p:nvSpPr>
+        <p:spPr>
+          <a:xfrm rot="3972658">
+            <a:off x="4761364" y="2697722"/>
+            <a:ext cx="598989" cy="304799"/>
+          </a:xfrm>
+          <a:prstGeom prst="rightArrow">
+            <a:avLst/>
+          </a:prstGeom>
+        </p:spPr>
+        <p:style>
+          <a:lnRef idx="2">
+            <a:schemeClr val="accent4">
+              <a:shade val="50000"/>
+            </a:schemeClr>
+          </a:lnRef>
+          <a:fillRef idx="1">
+            <a:schemeClr val="accent4"/>
+          </a:fillRef>
+          <a:effectRef idx="0">
+            <a:schemeClr val="accent4"/>
+          </a:effectRef>
+          <a:fontRef idx="minor">
+            <a:schemeClr val="lt1"/>
+          </a:fontRef>
+        </p:style>
+        <p:txBody>
+          <a:bodyPr rtlCol="0" anchor="ctr"/>
+          <a:lstStyle/>
+          <a:p>
+            <a:pPr algn="ctr"/>
+            <a:endParaRPr lang="en-US"/>
+          </a:p>
+        </p:txBody>
+      </p:sp>
+      <p:sp>
+        <p:nvSpPr>
+          <p:cNvPr id="11" name="Right Arrow 10"/>
+          <p:cNvSpPr/>
+          <p:nvPr/>
+        </p:nvSpPr>
+        <p:spPr>
+          <a:xfrm rot="7507579">
+            <a:off x="5767192" y="2686846"/>
+            <a:ext cx="605613" cy="304800"/>
+          </a:xfrm>
+          <a:prstGeom prst="rightArrow">
+            <a:avLst/>
+          </a:prstGeom>
+        </p:spPr>
+        <p:style>
+          <a:lnRef idx="2">
+            <a:schemeClr val="accent4">
+              <a:shade val="50000"/>
+            </a:schemeClr>
+          </a:lnRef>
+          <a:fillRef idx="1">
+            <a:schemeClr val="accent4"/>
+          </a:fillRef>
+          <a:effectRef idx="0">
+            <a:schemeClr val="accent4"/>
+          </a:effectRef>
+          <a:fontRef idx="minor">
+            <a:schemeClr val="lt1"/>
+          </a:fontRef>
+        </p:style>
+        <p:txBody>
+          <a:bodyPr rtlCol="0" anchor="ctr"/>
+          <a:lstStyle/>
+          <a:p>
+            <a:pPr algn="ctr"/>
+            <a:endParaRPr lang="en-US"/>
+          </a:p>
+        </p:txBody>
+      </p:sp>
+      <p:sp>
+        <p:nvSpPr>
+          <p:cNvPr id="12" name="Right Arrow 11"/>
+          <p:cNvSpPr/>
+          <p:nvPr/>
+        </p:nvSpPr>
+        <p:spPr>
+          <a:xfrm rot="6307087">
+            <a:off x="1924127" y="2463350"/>
+            <a:ext cx="758662" cy="304800"/>
+          </a:xfrm>
+          <a:prstGeom prst="rightArrow">
+            <a:avLst/>
+          </a:prstGeom>
+        </p:spPr>
+        <p:style>
+          <a:lnRef idx="2">
+            <a:schemeClr val="accent3">
+              <a:shade val="50000"/>
+            </a:schemeClr>
+          </a:lnRef>
+          <a:fillRef idx="1">
+            <a:schemeClr val="accent3"/>
+          </a:fillRef>
+          <a:effectRef idx="0">
+            <a:schemeClr val="accent3"/>
+          </a:effectRef>
+          <a:fontRef idx="minor">
+            <a:schemeClr val="lt1"/>
+          </a:fontRef>
+        </p:style>
+        <p:txBody>
+          <a:bodyPr rtlCol="0" anchor="ctr"/>
+          <a:lstStyle/>
+          <a:p>
+            <a:pPr algn="ctr"/>
+            <a:endParaRPr lang="en-US"/>
+          </a:p>
+        </p:txBody>
+      </p:sp>
+      <p:sp>
+        <p:nvSpPr>
+          <p:cNvPr id="13" name="Right Arrow 12"/>
+          <p:cNvSpPr/>
+          <p:nvPr/>
+        </p:nvSpPr>
+        <p:spPr>
+          <a:xfrm rot="8815306">
+            <a:off x="2932111" y="2903652"/>
+            <a:ext cx="1516175" cy="304800"/>
+          </a:xfrm>
+          <a:prstGeom prst="rightArrow">
+            <a:avLst/>
+          </a:prstGeom>
+        </p:spPr>
+        <p:style>
+          <a:lnRef idx="2">
+            <a:schemeClr val="accent3">
+              <a:shade val="50000"/>
+            </a:schemeClr>
+          </a:lnRef>
+          <a:fillRef idx="1">
+            <a:schemeClr val="accent3"/>
+          </a:fillRef>
+          <a:effectRef idx="0">
+            <a:schemeClr val="accent3"/>
+          </a:effectRef>
+          <a:fontRef idx="minor">
+            <a:schemeClr val="lt1"/>
+          </a:fontRef>
+        </p:style>
+        <p:txBody>
+          <a:bodyPr rtlCol="0" anchor="ctr"/>
+          <a:lstStyle/>
+          <a:p>
+            <a:pPr algn="ctr"/>
+            <a:endParaRPr lang="en-US"/>
+          </a:p>
+        </p:txBody>
+      </p:sp>
+      <p:sp>
+        <p:nvSpPr>
+          <p:cNvPr id="14" name="Right Arrow 13"/>
+          <p:cNvSpPr/>
+          <p:nvPr/>
+        </p:nvSpPr>
+        <p:spPr>
+          <a:xfrm rot="2645141">
+            <a:off x="3123181" y="2731447"/>
+            <a:ext cx="1842020" cy="304800"/>
+          </a:xfrm>
+          <a:prstGeom prst="rightArrow">
+            <a:avLst/>
+          </a:prstGeom>
+        </p:spPr>
+        <p:style>
+          <a:lnRef idx="2">
+            <a:schemeClr val="accent4">
+              <a:shade val="50000"/>
+            </a:schemeClr>
+          </a:lnRef>
+          <a:fillRef idx="1">
+            <a:schemeClr val="accent4"/>
+          </a:fillRef>
+          <a:effectRef idx="0">
+            <a:schemeClr val="accent4"/>
+          </a:effectRef>
+          <a:fontRef idx="minor">
+            <a:schemeClr val="lt1"/>
+          </a:fontRef>
+        </p:style>
+        <p:txBody>
+          <a:bodyPr rtlCol="0" anchor="ctr"/>
+          <a:lstStyle/>
+          <a:p>
+            <a:pPr algn="ctr"/>
+            <a:endParaRPr lang="en-US"/>
+          </a:p>
+        </p:txBody>
+      </p:sp>
+      <p:sp>
+        <p:nvSpPr>
+          <p:cNvPr id="15" name="Title 14"/>
+          <p:cNvSpPr>
+            <a:spLocks noGrp="1"/>
+          </p:cNvSpPr>
+          <p:nvPr>
+            <p:ph type="title"/>
+          </p:nvPr>
+        </p:nvSpPr>
+        <p:spPr/>
+        <p:txBody>
+          <a:bodyPr/>
+          <a:lstStyle/>
+          <a:p>
+            <a:pPr algn="ctr"/>
+            <a:r>
+              <a:rPr lang="en-US" dirty="0" smtClean="0"/>
+              <a:t>Bayesian Network (BOTTOM)</a:t>
+            </a:r>
+            <a:endParaRPr lang="en-US" dirty="0"/>
+          </a:p>
+        </p:txBody>
+      </p:sp>
+      <p:graphicFrame>
+        <p:nvGraphicFramePr>
+          <p:cNvPr id="16" name="Table 15"/>
+          <p:cNvGraphicFramePr>
+            <a:graphicFrameLocks noGrp="1"/>
+          </p:cNvGraphicFramePr>
+          <p:nvPr/>
+        </p:nvGraphicFramePr>
+        <p:xfrm>
+          <a:off x="4419600" y="4114800"/>
+          <a:ext cx="4114799" cy="2743200"/>
+        </p:xfrm>
+        <a:graphic>
+          <a:graphicData uri="http://schemas.openxmlformats.org/drawingml/2006/table">
+            <a:tbl>
+              <a:tblPr firstRow="1" bandRow="1">
+                <a:tableStyleId>{F5AB1C69-6EDB-4FF4-983F-18BD219EF322}</a:tableStyleId>
+              </a:tblPr>
+              <a:tblGrid>
+                <a:gridCol w="545550"/>
+                <a:gridCol w="545550"/>
+                <a:gridCol w="578659"/>
+                <a:gridCol w="2445040"/>
+              </a:tblGrid>
+              <a:tr h="279400">
+                <a:tc>
+                  <a:txBody>
+                    <a:bodyPr/>
+                    <a:lstStyle/>
+                    <a:p>
+                      <a:r>
+                        <a:rPr lang="en-US" sz="1400" dirty="0" smtClean="0"/>
+                        <a:t>T</a:t>
+                      </a:r>
+                      <a:endParaRPr lang="en-US" sz="1400" dirty="0"/>
+                    </a:p>
+                  </a:txBody>
+                  <a:tcPr/>
+                </a:tc>
+                <a:tc>
+                  <a:txBody>
+                    <a:bodyPr/>
+                    <a:lstStyle/>
+                    <a:p>
+                      <a:r>
+                        <a:rPr lang="en-US" sz="1400" dirty="0" smtClean="0"/>
+                        <a:t>L</a:t>
+                      </a:r>
+                      <a:endParaRPr lang="en-US" sz="1400" dirty="0"/>
+                    </a:p>
+                  </a:txBody>
+                  <a:tcPr/>
+                </a:tc>
+                <a:tc>
+                  <a:txBody>
+                    <a:bodyPr/>
+                    <a:lstStyle/>
+                    <a:p>
+                      <a:r>
+                        <a:rPr lang="en-US" sz="1400" dirty="0" smtClean="0"/>
+                        <a:t>B</a:t>
+                      </a:r>
+                      <a:endParaRPr lang="en-US" sz="1400" dirty="0"/>
+                    </a:p>
+                  </a:txBody>
+                  <a:tcPr/>
+                </a:tc>
+                <a:tc>
+                  <a:txBody>
+                    <a:bodyPr/>
+                    <a:lstStyle/>
+                    <a:p>
+                      <a:r>
+                        <a:rPr lang="en-US" sz="1400" dirty="0" smtClean="0"/>
+                        <a:t>P(D | T,</a:t>
+                      </a:r>
+                      <a:r>
+                        <a:rPr lang="en-US" sz="1400" baseline="0" dirty="0" smtClean="0"/>
+                        <a:t> L, B)</a:t>
+                      </a:r>
+                      <a:endParaRPr lang="en-US" sz="1400" dirty="0"/>
+                    </a:p>
+                  </a:txBody>
+                  <a:tcPr/>
+                </a:tc>
+              </a:tr>
+              <a:tr h="279400">
+                <a:tc>
+                  <a:txBody>
+                    <a:bodyPr/>
+                    <a:lstStyle/>
+                    <a:p>
+                      <a:r>
+                        <a:rPr lang="en-US" sz="1400" dirty="0" smtClean="0"/>
+                        <a:t>F</a:t>
+                      </a:r>
+                      <a:endParaRPr lang="en-US" sz="1400" dirty="0"/>
+                    </a:p>
+                  </a:txBody>
+                  <a:tcPr/>
+                </a:tc>
+                <a:tc>
+                  <a:txBody>
+                    <a:bodyPr/>
+                    <a:lstStyle/>
+                    <a:p>
+                      <a:r>
+                        <a:rPr lang="en-US" sz="1400" dirty="0" smtClean="0"/>
+                        <a:t>F</a:t>
+                      </a:r>
+                      <a:endParaRPr lang="en-US" sz="1400" dirty="0"/>
+                    </a:p>
+                  </a:txBody>
+                  <a:tcPr/>
+                </a:tc>
+                <a:tc>
+                  <a:txBody>
+                    <a:bodyPr/>
+                    <a:lstStyle/>
+                    <a:p>
+                      <a:r>
+                        <a:rPr lang="en-US" sz="1400" dirty="0" smtClean="0"/>
+                        <a:t>F</a:t>
+                      </a:r>
+                      <a:endParaRPr lang="en-US" sz="1400" dirty="0"/>
+                    </a:p>
+                  </a:txBody>
+                  <a:tcPr/>
+                </a:tc>
+                <a:tc>
+                  <a:txBody>
+                    <a:bodyPr/>
+                    <a:lstStyle/>
+                    <a:p>
+                      <a:endParaRPr lang="en-US" sz="1400"/>
+                    </a:p>
+                  </a:txBody>
+                  <a:tcPr/>
+                </a:tc>
+              </a:tr>
+              <a:tr h="279400">
+                <a:tc>
+                  <a:txBody>
+                    <a:bodyPr/>
+                    <a:lstStyle/>
+                    <a:p>
+                      <a:r>
+                        <a:rPr lang="en-US" sz="1400" dirty="0" smtClean="0"/>
+                        <a:t>F</a:t>
+                      </a:r>
+                      <a:endParaRPr lang="en-US" sz="1400" dirty="0"/>
+                    </a:p>
+                  </a:txBody>
+                  <a:tcPr/>
+                </a:tc>
+                <a:tc>
+                  <a:txBody>
+                    <a:bodyPr/>
+                    <a:lstStyle/>
+                    <a:p>
+                      <a:r>
+                        <a:rPr lang="en-US" sz="1400" dirty="0" smtClean="0"/>
+                        <a:t>F</a:t>
+                      </a:r>
+                      <a:endParaRPr lang="en-US" sz="1400" dirty="0"/>
+                    </a:p>
+                  </a:txBody>
+                  <a:tcPr/>
+                </a:tc>
+                <a:tc>
+                  <a:txBody>
+                    <a:bodyPr/>
+                    <a:lstStyle/>
+                    <a:p>
+                      <a:r>
+                        <a:rPr lang="en-US" sz="1400" dirty="0" smtClean="0"/>
+                        <a:t>T</a:t>
+                      </a:r>
+                      <a:endParaRPr lang="en-US" sz="1400" dirty="0"/>
+                    </a:p>
+                  </a:txBody>
+                  <a:tcPr/>
+                </a:tc>
+                <a:tc>
+                  <a:txBody>
+                    <a:bodyPr/>
+                    <a:lstStyle/>
+                    <a:p>
+                      <a:endParaRPr lang="en-US" sz="1400" dirty="0"/>
+                    </a:p>
+                  </a:txBody>
+                  <a:tcPr/>
+                </a:tc>
+              </a:tr>
+              <a:tr h="279400">
+                <a:tc>
+                  <a:txBody>
+                    <a:bodyPr/>
+                    <a:lstStyle/>
+                    <a:p>
+                      <a:r>
+                        <a:rPr lang="en-US" sz="1400" dirty="0" smtClean="0"/>
+                        <a:t>F</a:t>
+                      </a:r>
+                      <a:endParaRPr lang="en-US" sz="1400" dirty="0"/>
+                    </a:p>
+                  </a:txBody>
+                  <a:tcPr/>
+                </a:tc>
+                <a:tc>
+                  <a:txBody>
+                    <a:bodyPr/>
+                    <a:lstStyle/>
+                    <a:p>
+                      <a:r>
+                        <a:rPr lang="en-US" sz="1400" dirty="0" smtClean="0"/>
+                        <a:t>T</a:t>
+                      </a:r>
+                      <a:endParaRPr lang="en-US" sz="1400" dirty="0"/>
+                    </a:p>
+                  </a:txBody>
+                  <a:tcPr/>
+                </a:tc>
+                <a:tc>
+                  <a:txBody>
+                    <a:bodyPr/>
+                    <a:lstStyle/>
+                    <a:p>
+                      <a:r>
+                        <a:rPr lang="en-US" sz="1400" dirty="0" smtClean="0"/>
+                        <a:t>F</a:t>
+                      </a:r>
+                      <a:endParaRPr lang="en-US" sz="1400" dirty="0"/>
+                    </a:p>
+                  </a:txBody>
+                  <a:tcPr/>
+                </a:tc>
+                <a:tc>
+                  <a:txBody>
+                    <a:bodyPr/>
+                    <a:lstStyle/>
+                    <a:p>
+                      <a:endParaRPr lang="en-US" sz="1400" dirty="0"/>
+                    </a:p>
+                  </a:txBody>
+                  <a:tcPr/>
+                </a:tc>
+              </a:tr>
+              <a:tr h="279400">
+                <a:tc>
+                  <a:txBody>
+                    <a:bodyPr/>
+                    <a:lstStyle/>
+                    <a:p>
+                      <a:r>
+                        <a:rPr lang="en-US" sz="1400" dirty="0" smtClean="0"/>
+                        <a:t>F</a:t>
+                      </a:r>
+                      <a:endParaRPr lang="en-US" sz="1400" dirty="0"/>
+                    </a:p>
+                  </a:txBody>
+                  <a:tcPr/>
+                </a:tc>
+                <a:tc>
+                  <a:txBody>
+                    <a:bodyPr/>
+                    <a:lstStyle/>
+                    <a:p>
+                      <a:r>
+                        <a:rPr lang="en-US" sz="1400" dirty="0" smtClean="0"/>
+                        <a:t>T</a:t>
+                      </a:r>
+                      <a:endParaRPr lang="en-US" sz="1400" dirty="0"/>
+                    </a:p>
+                  </a:txBody>
+                  <a:tcPr/>
+                </a:tc>
+                <a:tc>
+                  <a:txBody>
+                    <a:bodyPr/>
+                    <a:lstStyle/>
+                    <a:p>
+                      <a:r>
+                        <a:rPr lang="en-US" sz="1400" dirty="0" smtClean="0"/>
+                        <a:t>T</a:t>
+                      </a:r>
+                      <a:endParaRPr lang="en-US" sz="1400" dirty="0"/>
+                    </a:p>
+                  </a:txBody>
+                  <a:tcPr/>
+                </a:tc>
+                <a:tc>
+                  <a:txBody>
+                    <a:bodyPr/>
+                    <a:lstStyle/>
+                    <a:p>
+                      <a:endParaRPr lang="en-US" sz="1400" dirty="0"/>
+                    </a:p>
+                  </a:txBody>
+                  <a:tcPr/>
+                </a:tc>
+              </a:tr>
+              <a:tr h="279400">
+                <a:tc>
+                  <a:txBody>
+                    <a:bodyPr/>
+                    <a:lstStyle/>
+                    <a:p>
+                      <a:r>
+                        <a:rPr lang="en-US" sz="1400" dirty="0" smtClean="0"/>
+                        <a:t>T</a:t>
+                      </a:r>
+                      <a:endParaRPr lang="en-US" sz="1400" dirty="0"/>
+                    </a:p>
+                  </a:txBody>
+                  <a:tcPr/>
+                </a:tc>
+                <a:tc>
+                  <a:txBody>
+                    <a:bodyPr/>
+                    <a:lstStyle/>
+                    <a:p>
+                      <a:r>
+                        <a:rPr lang="en-US" sz="1400" dirty="0" smtClean="0"/>
+                        <a:t>F</a:t>
+                      </a:r>
+                      <a:endParaRPr lang="en-US" sz="1400" dirty="0"/>
+                    </a:p>
+                  </a:txBody>
+                  <a:tcPr/>
+                </a:tc>
+                <a:tc>
+                  <a:txBody>
+                    <a:bodyPr/>
+                    <a:lstStyle/>
+                    <a:p>
+                      <a:r>
+                        <a:rPr lang="en-US" sz="1400" dirty="0" smtClean="0"/>
+                        <a:t>F</a:t>
+                      </a:r>
+                      <a:endParaRPr lang="en-US" sz="1400" dirty="0"/>
+                    </a:p>
+                  </a:txBody>
+                  <a:tcPr/>
+                </a:tc>
+                <a:tc>
+                  <a:txBody>
+                    <a:bodyPr/>
+                    <a:lstStyle/>
+                    <a:p>
+                      <a:endParaRPr lang="en-US" sz="1400" dirty="0"/>
+                    </a:p>
+                  </a:txBody>
+                  <a:tcPr/>
+                </a:tc>
+              </a:tr>
+              <a:tr h="279400">
+                <a:tc>
+                  <a:txBody>
+                    <a:bodyPr/>
+                    <a:lstStyle/>
+                    <a:p>
+                      <a:r>
+                        <a:rPr lang="en-US" sz="1400" dirty="0" smtClean="0"/>
+                        <a:t>T</a:t>
+                      </a:r>
+                      <a:endParaRPr lang="en-US" sz="1400" dirty="0"/>
+                    </a:p>
+                  </a:txBody>
+                  <a:tcPr/>
+                </a:tc>
+                <a:tc>
+                  <a:txBody>
+                    <a:bodyPr/>
+                    <a:lstStyle/>
+                    <a:p>
+                      <a:r>
+                        <a:rPr lang="en-US" sz="1400" dirty="0" smtClean="0"/>
+                        <a:t>F</a:t>
+                      </a:r>
+                      <a:endParaRPr lang="en-US" sz="1400" dirty="0"/>
+                    </a:p>
+                  </a:txBody>
+                  <a:tcPr/>
+                </a:tc>
+                <a:tc>
+                  <a:txBody>
+                    <a:bodyPr/>
+                    <a:lstStyle/>
+                    <a:p>
+                      <a:r>
+                        <a:rPr lang="en-US" sz="1400" dirty="0" smtClean="0"/>
+                        <a:t>T</a:t>
+                      </a:r>
+                      <a:endParaRPr lang="en-US" sz="1400" dirty="0"/>
+                    </a:p>
+                  </a:txBody>
+                  <a:tcPr/>
+                </a:tc>
+                <a:tc>
+                  <a:txBody>
+                    <a:bodyPr/>
+                    <a:lstStyle/>
+                    <a:p>
+                      <a:endParaRPr lang="en-US" sz="1400" dirty="0"/>
+                    </a:p>
+                  </a:txBody>
+                  <a:tcPr/>
+                </a:tc>
+              </a:tr>
+              <a:tr h="279400">
+                <a:tc>
+                  <a:txBody>
+                    <a:bodyPr/>
+                    <a:lstStyle/>
+                    <a:p>
+                      <a:r>
+                        <a:rPr lang="en-US" sz="1400" dirty="0" smtClean="0"/>
+                        <a:t>T</a:t>
+                      </a:r>
+                      <a:endParaRPr lang="en-US" sz="1400" dirty="0"/>
+                    </a:p>
+                  </a:txBody>
+                  <a:tcPr/>
+                </a:tc>
+                <a:tc>
+                  <a:txBody>
+                    <a:bodyPr/>
+                    <a:lstStyle/>
+                    <a:p>
+                      <a:r>
+                        <a:rPr lang="en-US" sz="1400" dirty="0" smtClean="0"/>
+                        <a:t>T</a:t>
+                      </a:r>
+                      <a:endParaRPr lang="en-US" sz="1400" dirty="0"/>
+                    </a:p>
+                  </a:txBody>
+                  <a:tcPr/>
+                </a:tc>
+                <a:tc>
+                  <a:txBody>
+                    <a:bodyPr/>
+                    <a:lstStyle/>
+                    <a:p>
+                      <a:r>
+                        <a:rPr lang="en-US" sz="1400" dirty="0" smtClean="0"/>
+                        <a:t>F</a:t>
+                      </a:r>
+                      <a:endParaRPr lang="en-US" sz="1400" dirty="0"/>
+                    </a:p>
+                  </a:txBody>
+                  <a:tcPr/>
+                </a:tc>
+                <a:tc>
+                  <a:txBody>
+                    <a:bodyPr/>
+                    <a:lstStyle/>
+                    <a:p>
+                      <a:endParaRPr lang="en-US" sz="1400" dirty="0"/>
+                    </a:p>
+                  </a:txBody>
+                  <a:tcPr/>
+                </a:tc>
+              </a:tr>
+              <a:tr h="279400">
+                <a:tc>
+                  <a:txBody>
+                    <a:bodyPr/>
+                    <a:lstStyle/>
+                    <a:p>
+                      <a:r>
+                        <a:rPr lang="en-US" sz="1400" dirty="0" smtClean="0"/>
+                        <a:t>T</a:t>
+                      </a:r>
+                      <a:endParaRPr lang="en-US" sz="1400" dirty="0"/>
+                    </a:p>
+                  </a:txBody>
+                  <a:tcPr/>
+                </a:tc>
+                <a:tc>
+                  <a:txBody>
+                    <a:bodyPr/>
+                    <a:lstStyle/>
+                    <a:p>
+                      <a:r>
+                        <a:rPr lang="en-US" sz="1400" dirty="0" smtClean="0"/>
+                        <a:t>T</a:t>
+                      </a:r>
+                      <a:endParaRPr lang="en-US" sz="1400" dirty="0"/>
+                    </a:p>
+                  </a:txBody>
+                  <a:tcPr/>
+                </a:tc>
+                <a:tc>
+                  <a:txBody>
+                    <a:bodyPr/>
+                    <a:lstStyle/>
+                    <a:p>
+                      <a:r>
+                        <a:rPr lang="en-US" sz="1400" dirty="0" smtClean="0"/>
+                        <a:t>T</a:t>
+                      </a:r>
+                      <a:endParaRPr lang="en-US" sz="1400" dirty="0"/>
+                    </a:p>
+                  </a:txBody>
+                  <a:tcPr/>
+                </a:tc>
+                <a:tc>
+                  <a:txBody>
+                    <a:bodyPr/>
+                    <a:lstStyle/>
+                    <a:p>
+                      <a:endParaRPr lang="en-US" sz="1400" dirty="0"/>
+                    </a:p>
+                  </a:txBody>
+                  <a:tcPr/>
                 </a:tc>
               </a:tr>
             </a:tbl>

</xml_diff>